<commit_message>
lucy xsss servlet filter 적용 및 작동확인
</commit_message>
<xml_diff>
--- a/20220929_teamA.pptx
+++ b/20220929_teamA.pptx
@@ -11500,13 +11500,13 @@
   <p:clrMapOvr>
     <a:masterClrMapping/>
   </p:clrMapOvr>
-  <mc:AlternateContent xmlns:mc="http://schemas.openxmlformats.org/markup-compatibility/2006">
-    <mc:Choice xmlns:p14="http://schemas.microsoft.com/office/powerpoint/2010/main" Requires="p14">
+  <mc:AlternateContent xmlns:mc="http://schemas.openxmlformats.org/markup-compatibility/2006" xmlns:p14="http://schemas.microsoft.com/office/powerpoint/2010/main">
+    <mc:Choice Requires="p14">
       <p:transition spd="med" p14:dur="700">
         <p:fade/>
       </p:transition>
     </mc:Choice>
-    <mc:Fallback>
+    <mc:Fallback xmlns="">
       <p:transition spd="med">
         <p:fade/>
       </p:transition>
@@ -11969,13 +11969,13 @@
   <p:clrMapOvr>
     <a:masterClrMapping/>
   </p:clrMapOvr>
-  <mc:AlternateContent xmlns:mc="http://schemas.openxmlformats.org/markup-compatibility/2006">
-    <mc:Choice xmlns:p14="http://schemas.microsoft.com/office/powerpoint/2010/main" Requires="p14">
+  <mc:AlternateContent xmlns:mc="http://schemas.openxmlformats.org/markup-compatibility/2006" xmlns:p14="http://schemas.microsoft.com/office/powerpoint/2010/main">
+    <mc:Choice Requires="p14">
       <p:transition spd="med" p14:dur="700">
         <p:fade/>
       </p:transition>
     </mc:Choice>
-    <mc:Fallback>
+    <mc:Fallback xmlns="">
       <p:transition spd="med">
         <p:fade/>
       </p:transition>
@@ -14805,13 +14805,13 @@
   <p:clrMapOvr>
     <a:masterClrMapping/>
   </p:clrMapOvr>
-  <mc:AlternateContent xmlns:mc="http://schemas.openxmlformats.org/markup-compatibility/2006">
-    <mc:Choice xmlns:p14="http://schemas.microsoft.com/office/powerpoint/2010/main" Requires="p14">
+  <mc:AlternateContent xmlns:mc="http://schemas.openxmlformats.org/markup-compatibility/2006" xmlns:p14="http://schemas.microsoft.com/office/powerpoint/2010/main">
+    <mc:Choice Requires="p14">
       <p:transition spd="med" p14:dur="700">
         <p:fade/>
       </p:transition>
     </mc:Choice>
-    <mc:Fallback>
+    <mc:Fallback xmlns="">
       <p:transition spd="med">
         <p:fade/>
       </p:transition>
@@ -15346,13 +15346,13 @@
   <p:clrMapOvr>
     <a:masterClrMapping/>
   </p:clrMapOvr>
-  <mc:AlternateContent xmlns:mc="http://schemas.openxmlformats.org/markup-compatibility/2006">
-    <mc:Choice xmlns:p14="http://schemas.microsoft.com/office/powerpoint/2010/main" Requires="p14">
+  <mc:AlternateContent xmlns:mc="http://schemas.openxmlformats.org/markup-compatibility/2006" xmlns:p14="http://schemas.microsoft.com/office/powerpoint/2010/main">
+    <mc:Choice Requires="p14">
       <p:transition spd="med" p14:dur="700">
         <p:fade/>
       </p:transition>
     </mc:Choice>
-    <mc:Fallback>
+    <mc:Fallback xmlns="">
       <p:transition spd="med">
         <p:fade/>
       </p:transition>
@@ -15901,13 +15901,13 @@
   <p:clrMapOvr>
     <a:masterClrMapping/>
   </p:clrMapOvr>
-  <mc:AlternateContent xmlns:mc="http://schemas.openxmlformats.org/markup-compatibility/2006">
-    <mc:Choice xmlns:p14="http://schemas.microsoft.com/office/powerpoint/2010/main" Requires="p14">
+  <mc:AlternateContent xmlns:mc="http://schemas.openxmlformats.org/markup-compatibility/2006" xmlns:p14="http://schemas.microsoft.com/office/powerpoint/2010/main">
+    <mc:Choice Requires="p14">
       <p:transition spd="med" p14:dur="700">
         <p:fade/>
       </p:transition>
     </mc:Choice>
-    <mc:Fallback>
+    <mc:Fallback xmlns="">
       <p:transition spd="med">
         <p:fade/>
       </p:transition>
@@ -16947,13 +16947,13 @@
   <p:clrMapOvr>
     <a:masterClrMapping/>
   </p:clrMapOvr>
-  <mc:AlternateContent xmlns:mc="http://schemas.openxmlformats.org/markup-compatibility/2006">
-    <mc:Choice xmlns:p14="http://schemas.microsoft.com/office/powerpoint/2010/main" Requires="p14">
+  <mc:AlternateContent xmlns:mc="http://schemas.openxmlformats.org/markup-compatibility/2006" xmlns:p14="http://schemas.microsoft.com/office/powerpoint/2010/main">
+    <mc:Choice Requires="p14">
       <p:transition spd="med" p14:dur="700">
         <p:fade/>
       </p:transition>
     </mc:Choice>
-    <mc:Fallback>
+    <mc:Fallback xmlns="">
       <p:transition spd="med">
         <p:fade/>
       </p:transition>
@@ -18630,13 +18630,13 @@
   <p:clrMapOvr>
     <a:masterClrMapping/>
   </p:clrMapOvr>
-  <mc:AlternateContent xmlns:mc="http://schemas.openxmlformats.org/markup-compatibility/2006">
-    <mc:Choice xmlns:p14="http://schemas.microsoft.com/office/powerpoint/2010/main" Requires="p14">
+  <mc:AlternateContent xmlns:mc="http://schemas.openxmlformats.org/markup-compatibility/2006" xmlns:p14="http://schemas.microsoft.com/office/powerpoint/2010/main">
+    <mc:Choice Requires="p14">
       <p:transition spd="med" p14:dur="700">
         <p:fade/>
       </p:transition>
     </mc:Choice>
-    <mc:Fallback>
+    <mc:Fallback xmlns="">
       <p:transition spd="med">
         <p:fade/>
       </p:transition>
@@ -20059,13 +20059,13 @@
   <p:clrMapOvr>
     <a:masterClrMapping/>
   </p:clrMapOvr>
-  <mc:AlternateContent xmlns:mc="http://schemas.openxmlformats.org/markup-compatibility/2006">
-    <mc:Choice xmlns:p14="http://schemas.microsoft.com/office/powerpoint/2010/main" Requires="p14">
+  <mc:AlternateContent xmlns:mc="http://schemas.openxmlformats.org/markup-compatibility/2006" xmlns:p14="http://schemas.microsoft.com/office/powerpoint/2010/main">
+    <mc:Choice Requires="p14">
       <p:transition spd="med" p14:dur="700">
         <p:fade/>
       </p:transition>
     </mc:Choice>
-    <mc:Fallback>
+    <mc:Fallback xmlns="">
       <p:transition spd="med">
         <p:fade/>
       </p:transition>
@@ -22411,13 +22411,13 @@
   <p:clrMapOvr>
     <a:masterClrMapping/>
   </p:clrMapOvr>
-  <mc:AlternateContent xmlns:mc="http://schemas.openxmlformats.org/markup-compatibility/2006">
-    <mc:Choice xmlns:p14="http://schemas.microsoft.com/office/powerpoint/2010/main" Requires="p14">
+  <mc:AlternateContent xmlns:mc="http://schemas.openxmlformats.org/markup-compatibility/2006" xmlns:p14="http://schemas.microsoft.com/office/powerpoint/2010/main">
+    <mc:Choice Requires="p14">
       <p:transition spd="med" p14:dur="700">
         <p:fade/>
       </p:transition>
     </mc:Choice>
-    <mc:Fallback>
+    <mc:Fallback xmlns="">
       <p:transition spd="med">
         <p:fade/>
       </p:transition>
@@ -23255,13 +23255,13 @@
   <p:clrMapOvr>
     <a:masterClrMapping/>
   </p:clrMapOvr>
-  <mc:AlternateContent xmlns:mc="http://schemas.openxmlformats.org/markup-compatibility/2006">
-    <mc:Choice xmlns:p14="http://schemas.microsoft.com/office/powerpoint/2010/main" Requires="p14">
+  <mc:AlternateContent xmlns:mc="http://schemas.openxmlformats.org/markup-compatibility/2006" xmlns:p14="http://schemas.microsoft.com/office/powerpoint/2010/main">
+    <mc:Choice Requires="p14">
       <p:transition spd="med" p14:dur="700">
         <p:fade/>
       </p:transition>
     </mc:Choice>
-    <mc:Fallback>
+    <mc:Fallback xmlns="">
       <p:transition spd="med">
         <p:fade/>
       </p:transition>
@@ -23900,13 +23900,13 @@
   <p:clrMapOvr>
     <a:masterClrMapping/>
   </p:clrMapOvr>
-  <mc:AlternateContent xmlns:mc="http://schemas.openxmlformats.org/markup-compatibility/2006">
-    <mc:Choice xmlns:p14="http://schemas.microsoft.com/office/powerpoint/2010/main" Requires="p14">
+  <mc:AlternateContent xmlns:mc="http://schemas.openxmlformats.org/markup-compatibility/2006" xmlns:p14="http://schemas.microsoft.com/office/powerpoint/2010/main">
+    <mc:Choice Requires="p14">
       <p:transition spd="med" p14:dur="700">
         <p:fade/>
       </p:transition>
     </mc:Choice>
-    <mc:Fallback>
+    <mc:Fallback xmlns="">
       <p:transition spd="med">
         <p:fade/>
       </p:transition>
@@ -24475,17 +24475,7 @@
                 <a:latin typeface="HY강M" panose="02030600000101010101" pitchFamily="18" charset="-127"/>
                 <a:ea typeface="HY강M" panose="02030600000101010101" pitchFamily="18" charset="-127"/>
               </a:rPr>
-              <a:t>0</a:t>
-            </a:r>
-            <a:r>
-              <a:rPr lang="en-US" altLang="ko-KR" sz="3200" b="1" smtClean="0">
-                <a:solidFill>
-                  <a:srgbClr val="40474D"/>
-                </a:solidFill>
-                <a:latin typeface="HY강M" panose="02030600000101010101" pitchFamily="18" charset="-127"/>
-                <a:ea typeface="HY강M" panose="02030600000101010101" pitchFamily="18" charset="-127"/>
-              </a:rPr>
-              <a:t>%</a:t>
+              <a:t>0%</a:t>
             </a:r>
             <a:endParaRPr lang="ko-KR" altLang="en-US" sz="3200" b="1" dirty="0">
               <a:solidFill>
@@ -24647,13 +24637,13 @@
   <p:clrMapOvr>
     <a:masterClrMapping/>
   </p:clrMapOvr>
-  <mc:AlternateContent xmlns:mc="http://schemas.openxmlformats.org/markup-compatibility/2006">
-    <mc:Choice xmlns:p14="http://schemas.microsoft.com/office/powerpoint/2010/main" Requires="p14">
+  <mc:AlternateContent xmlns:mc="http://schemas.openxmlformats.org/markup-compatibility/2006" xmlns:p14="http://schemas.microsoft.com/office/powerpoint/2010/main">
+    <mc:Choice Requires="p14">
       <p:transition spd="med" p14:dur="700">
         <p:fade/>
       </p:transition>
     </mc:Choice>
-    <mc:Fallback>
+    <mc:Fallback xmlns="">
       <p:transition spd="med">
         <p:fade/>
       </p:transition>
@@ -24783,13 +24773,13 @@
   <p:clrMapOvr>
     <a:masterClrMapping/>
   </p:clrMapOvr>
-  <mc:AlternateContent xmlns:mc="http://schemas.openxmlformats.org/markup-compatibility/2006">
-    <mc:Choice xmlns:p14="http://schemas.microsoft.com/office/powerpoint/2010/main" Requires="p14">
+  <mc:AlternateContent xmlns:mc="http://schemas.openxmlformats.org/markup-compatibility/2006" xmlns:p14="http://schemas.microsoft.com/office/powerpoint/2010/main">
+    <mc:Choice Requires="p14">
       <p:transition spd="med" p14:dur="700">
         <p:fade/>
       </p:transition>
     </mc:Choice>
-    <mc:Fallback>
+    <mc:Fallback xmlns="">
       <p:transition spd="med">
         <p:fade/>
       </p:transition>
@@ -24961,13 +24951,13 @@
   <p:clrMapOvr>
     <a:masterClrMapping/>
   </p:clrMapOvr>
-  <mc:AlternateContent xmlns:mc="http://schemas.openxmlformats.org/markup-compatibility/2006">
-    <mc:Choice xmlns:p14="http://schemas.microsoft.com/office/powerpoint/2010/main" Requires="p14">
+  <mc:AlternateContent xmlns:mc="http://schemas.openxmlformats.org/markup-compatibility/2006" xmlns:p14="http://schemas.microsoft.com/office/powerpoint/2010/main">
+    <mc:Choice Requires="p14">
       <p:transition spd="med" p14:dur="700">
         <p:fade/>
       </p:transition>
     </mc:Choice>
-    <mc:Fallback>
+    <mc:Fallback xmlns="">
       <p:transition spd="med">
         <p:fade/>
       </p:transition>
@@ -25040,13 +25030,13 @@
   <p:clrMapOvr>
     <a:masterClrMapping/>
   </p:clrMapOvr>
-  <mc:AlternateContent xmlns:mc="http://schemas.openxmlformats.org/markup-compatibility/2006">
-    <mc:Choice xmlns:p14="http://schemas.microsoft.com/office/powerpoint/2010/main" Requires="p14">
+  <mc:AlternateContent xmlns:mc="http://schemas.openxmlformats.org/markup-compatibility/2006" xmlns:p14="http://schemas.microsoft.com/office/powerpoint/2010/main">
+    <mc:Choice Requires="p14">
       <p:transition spd="med" p14:dur="700">
         <p:fade/>
       </p:transition>
     </mc:Choice>
-    <mc:Fallback>
+    <mc:Fallback xmlns="">
       <p:transition spd="med">
         <p:fade/>
       </p:transition>
@@ -26336,13 +26326,13 @@
   <p:clrMapOvr>
     <a:masterClrMapping/>
   </p:clrMapOvr>
-  <mc:AlternateContent xmlns:mc="http://schemas.openxmlformats.org/markup-compatibility/2006">
-    <mc:Choice xmlns:p14="http://schemas.microsoft.com/office/powerpoint/2010/main" Requires="p14">
+  <mc:AlternateContent xmlns:mc="http://schemas.openxmlformats.org/markup-compatibility/2006" xmlns:p14="http://schemas.microsoft.com/office/powerpoint/2010/main">
+    <mc:Choice Requires="p14">
       <p:transition spd="med" p14:dur="700">
         <p:fade/>
       </p:transition>
     </mc:Choice>
-    <mc:Fallback>
+    <mc:Fallback xmlns="">
       <p:transition spd="med">
         <p:fade/>
       </p:transition>
@@ -27192,13 +27182,13 @@
   <p:clrMapOvr>
     <a:masterClrMapping/>
   </p:clrMapOvr>
-  <mc:AlternateContent xmlns:mc="http://schemas.openxmlformats.org/markup-compatibility/2006">
-    <mc:Choice xmlns:p14="http://schemas.microsoft.com/office/powerpoint/2010/main" Requires="p14">
+  <mc:AlternateContent xmlns:mc="http://schemas.openxmlformats.org/markup-compatibility/2006" xmlns:p14="http://schemas.microsoft.com/office/powerpoint/2010/main">
+    <mc:Choice Requires="p14">
       <p:transition spd="med" p14:dur="700">
         <p:fade/>
       </p:transition>
     </mc:Choice>
-    <mc:Fallback>
+    <mc:Fallback xmlns="">
       <p:transition spd="med">
         <p:fade/>
       </p:transition>
@@ -27318,13 +27308,13 @@
   <p:clrMapOvr>
     <a:masterClrMapping/>
   </p:clrMapOvr>
-  <mc:AlternateContent xmlns:mc="http://schemas.openxmlformats.org/markup-compatibility/2006">
-    <mc:Choice xmlns:p14="http://schemas.microsoft.com/office/powerpoint/2010/main" Requires="p14">
+  <mc:AlternateContent xmlns:mc="http://schemas.openxmlformats.org/markup-compatibility/2006" xmlns:p14="http://schemas.microsoft.com/office/powerpoint/2010/main">
+    <mc:Choice Requires="p14">
       <p:transition spd="med" p14:dur="700">
         <p:fade/>
       </p:transition>
     </mc:Choice>
-    <mc:Fallback>
+    <mc:Fallback xmlns="">
       <p:transition spd="med">
         <p:fade/>
       </p:transition>
@@ -31051,17 +31041,7 @@
                 <a:latin typeface="HY강M" panose="02030600000101010101" pitchFamily="18" charset="-127"/>
                 <a:ea typeface="HY강M" panose="02030600000101010101" pitchFamily="18" charset="-127"/>
               </a:rPr>
-              <a:t>0</a:t>
-            </a:r>
-            <a:r>
-              <a:rPr lang="en-US" altLang="ko-KR" sz="3200" b="1" smtClean="0">
-                <a:solidFill>
-                  <a:srgbClr val="40474D"/>
-                </a:solidFill>
-                <a:latin typeface="HY강M" panose="02030600000101010101" pitchFamily="18" charset="-127"/>
-                <a:ea typeface="HY강M" panose="02030600000101010101" pitchFamily="18" charset="-127"/>
-              </a:rPr>
-              <a:t>%</a:t>
+              <a:t>0%</a:t>
             </a:r>
             <a:endParaRPr lang="ko-KR" altLang="en-US" sz="3200" b="1" dirty="0">
               <a:solidFill>

</xml_diff>